<commit_message>
Adding init for modules dir
</commit_message>
<xml_diff>
--- a/Blank/Lecture_05_ Tokenization_03.pptx
+++ b/Blank/Lecture_05_ Tokenization_03.pptx
@@ -267,7 +267,7 @@
   </p:defaultTextStyle>
   <p:extLst>
     <p:ext uri="GoogleSlidesCustomDataVersion2">
-      <go:slidesCustomData xmlns:go="http://customooxmlschemas.google.com/" r:id="rId30" roundtripDataSignature="AMtx7mhDxOqICIGUZTSBr0XGPAmfEZ5OxA=="/>
+      <go:slidesCustomData xmlns:go="http://customooxmlschemas.google.com/" r:id="rId30" roundtripDataSignature="AMtx7mizZVBybQxIx/MIe8lh7GJfY52YEA=="/>
     </p:ext>
   </p:extLst>
 </p:presentation>
@@ -2185,7 +2185,7 @@
       </p:grpSpPr>
       <p:sp>
         <p:nvSpPr>
-          <p:cNvPr id="188" name="Google Shape;188;g3bbeee67e43_0_147:notes"/>
+          <p:cNvPr id="188" name="Google Shape;188;g3bbeee67e43_0_137:notes"/>
           <p:cNvSpPr/>
           <p:nvPr>
             <p:ph idx="2" type="sldImg"/>
@@ -2230,7 +2230,7 @@
       </p:sp>
       <p:sp>
         <p:nvSpPr>
-          <p:cNvPr id="189" name="Google Shape;189;g3bbeee67e43_0_147:notes"/>
+          <p:cNvPr id="189" name="Google Shape;189;g3bbeee67e43_0_137:notes"/>
           <p:cNvSpPr txBox="1"/>
           <p:nvPr>
             <p:ph idx="1" type="body"/>
@@ -2302,7 +2302,7 @@
       </p:grpSpPr>
       <p:sp>
         <p:nvSpPr>
-          <p:cNvPr id="194" name="Google Shape;194;g3bbeee67e43_0_142:notes"/>
+          <p:cNvPr id="194" name="Google Shape;194;g3bbeee67e43_0_126:notes"/>
           <p:cNvSpPr/>
           <p:nvPr>
             <p:ph idx="2" type="sldImg"/>
@@ -2347,7 +2347,7 @@
       </p:sp>
       <p:sp>
         <p:nvSpPr>
-          <p:cNvPr id="195" name="Google Shape;195;g3bbeee67e43_0_142:notes"/>
+          <p:cNvPr id="195" name="Google Shape;195;g3bbeee67e43_0_126:notes"/>
           <p:cNvSpPr txBox="1"/>
           <p:nvPr>
             <p:ph idx="1" type="body"/>
@@ -2419,7 +2419,7 @@
       </p:grpSpPr>
       <p:sp>
         <p:nvSpPr>
-          <p:cNvPr id="200" name="Google Shape;200;g3bbeee67e43_0_126:notes"/>
+          <p:cNvPr id="200" name="Google Shape;200;g3bbeee67e43_0_132:notes"/>
           <p:cNvSpPr/>
           <p:nvPr>
             <p:ph idx="2" type="sldImg"/>
@@ -2464,7 +2464,7 @@
       </p:sp>
       <p:sp>
         <p:nvSpPr>
-          <p:cNvPr id="201" name="Google Shape;201;g3bbeee67e43_0_126:notes"/>
+          <p:cNvPr id="201" name="Google Shape;201;g3bbeee67e43_0_132:notes"/>
           <p:cNvSpPr txBox="1"/>
           <p:nvPr>
             <p:ph idx="1" type="body"/>
@@ -2536,7 +2536,7 @@
       </p:grpSpPr>
       <p:sp>
         <p:nvSpPr>
-          <p:cNvPr id="206" name="Google Shape;206;g3bbeee67e43_0_132:notes"/>
+          <p:cNvPr id="206" name="Google Shape;206;g3bbeee67e43_0_147:notes"/>
           <p:cNvSpPr/>
           <p:nvPr>
             <p:ph idx="2" type="sldImg"/>
@@ -2581,7 +2581,7 @@
       </p:sp>
       <p:sp>
         <p:nvSpPr>
-          <p:cNvPr id="207" name="Google Shape;207;g3bbeee67e43_0_132:notes"/>
+          <p:cNvPr id="207" name="Google Shape;207;g3bbeee67e43_0_147:notes"/>
           <p:cNvSpPr txBox="1"/>
           <p:nvPr>
             <p:ph idx="1" type="body"/>
@@ -2653,7 +2653,7 @@
       </p:grpSpPr>
       <p:sp>
         <p:nvSpPr>
-          <p:cNvPr id="212" name="Google Shape;212;g3bbeee67e43_0_137:notes"/>
+          <p:cNvPr id="212" name="Google Shape;212;g3bbeee67e43_0_142:notes"/>
           <p:cNvSpPr/>
           <p:nvPr>
             <p:ph idx="2" type="sldImg"/>
@@ -2698,7 +2698,7 @@
       </p:sp>
       <p:sp>
         <p:nvSpPr>
-          <p:cNvPr id="213" name="Google Shape;213;g3bbeee67e43_0_137:notes"/>
+          <p:cNvPr id="213" name="Google Shape;213;g3bbeee67e43_0_142:notes"/>
           <p:cNvSpPr txBox="1"/>
           <p:nvPr>
             <p:ph idx="1" type="body"/>
@@ -12383,7 +12383,7 @@
       </p:grpSpPr>
       <p:sp>
         <p:nvSpPr>
-          <p:cNvPr id="191" name="Google Shape;191;g3bbeee67e43_0_147"/>
+          <p:cNvPr id="191" name="Google Shape;191;g3bbeee67e43_0_137"/>
           <p:cNvSpPr txBox="1"/>
           <p:nvPr>
             <p:ph type="title"/>
@@ -12427,15 +12427,7 @@
                   <a:srgbClr val="A31415"/>
                 </a:solidFill>
               </a:rPr>
-              <a:t>Machine</a:t>
-            </a:r>
-            <a:r>
-              <a:rPr lang="en">
-                <a:solidFill>
-                  <a:srgbClr val="A31415"/>
-                </a:solidFill>
-              </a:rPr>
-              <a:t> Learning</a:t>
+              <a:t>Deep Learning</a:t>
             </a:r>
             <a:r>
               <a:rPr lang="en"/>
@@ -12451,7 +12443,7 @@
                 <a:cs typeface="Consolas"/>
                 <a:sym typeface="Consolas"/>
               </a:rPr>
-              <a:t>Classification</a:t>
+              <a:t>Dataset</a:t>
             </a:r>
             <a:endParaRPr>
               <a:solidFill>
@@ -12467,7 +12459,7 @@
       </p:sp>
       <p:sp>
         <p:nvSpPr>
-          <p:cNvPr id="192" name="Google Shape;192;g3bbeee67e43_0_147"/>
+          <p:cNvPr id="192" name="Google Shape;192;g3bbeee67e43_0_137"/>
           <p:cNvSpPr txBox="1"/>
           <p:nvPr>
             <p:ph idx="1" type="body"/>
@@ -12476,7 +12468,7 @@
         <p:spPr>
           <a:xfrm>
             <a:off x="457200" y="1600200"/>
-            <a:ext cx="8229600" cy="4788300"/>
+            <a:ext cx="8229600" cy="1728600"/>
           </a:xfrm>
           <a:prstGeom prst="rect">
             <a:avLst/>
@@ -12507,19 +12499,7 @@
             </a:pPr>
             <a:r>
               <a:rPr lang="en"/>
-              <a:t>In </a:t>
-            </a:r>
-            <a:r>
-              <a:rPr b="1" lang="en">
-                <a:solidFill>
-                  <a:srgbClr val="A31515"/>
-                </a:solidFill>
-              </a:rPr>
-              <a:t>machine learning</a:t>
-            </a:r>
-            <a:r>
-              <a:rPr lang="en"/>
-              <a:t>, a </a:t>
+              <a:t>A </a:t>
             </a:r>
             <a:r>
               <a:rPr b="1" lang="en">
@@ -12531,39 +12511,11 @@
                 <a:cs typeface="Consolas"/>
                 <a:sym typeface="Consolas"/>
               </a:rPr>
-              <a:t>classification</a:t>
-            </a:r>
-            <a:r>
-              <a:rPr b="1" lang="en"/>
-              <a:t> </a:t>
+              <a:t>dataset </a:t>
             </a:r>
             <a:r>
               <a:rPr lang="en"/>
-              <a:t>task</a:t>
-            </a:r>
-            <a:r>
-              <a:rPr lang="en"/>
-              <a:t> is one in which we’re </a:t>
-            </a:r>
-            <a:r>
-              <a:rPr lang="en"/>
-              <a:t>trying</a:t>
-            </a:r>
-            <a:r>
-              <a:rPr lang="en"/>
-              <a:t> to </a:t>
-            </a:r>
-            <a:r>
-              <a:rPr b="1" lang="en">
-                <a:solidFill>
-                  <a:srgbClr val="465510"/>
-                </a:solidFill>
-              </a:rPr>
-              <a:t>predict a category or label</a:t>
-            </a:r>
-            <a:r>
-              <a:rPr lang="en"/>
-              <a:t> given a </a:t>
+              <a:t>is a collection of </a:t>
             </a:r>
             <a:r>
               <a:rPr b="1" lang="en">
@@ -12575,11 +12527,39 @@
                 <a:cs typeface="Consolas"/>
                 <a:sym typeface="Consolas"/>
               </a:rPr>
-              <a:t>sample</a:t>
+              <a:t>feature vectors</a:t>
             </a:r>
             <a:r>
               <a:rPr lang="en"/>
-              <a:t>.</a:t>
+              <a:t> for </a:t>
+            </a:r>
+            <a:r>
+              <a:rPr b="1" lang="en">
+                <a:solidFill>
+                  <a:srgbClr val="5AABBC"/>
+                </a:solidFill>
+                <a:latin typeface="Consolas"/>
+                <a:ea typeface="Consolas"/>
+                <a:cs typeface="Consolas"/>
+                <a:sym typeface="Consolas"/>
+              </a:rPr>
+              <a:t>samples</a:t>
+            </a:r>
+            <a:r>
+              <a:rPr lang="en"/>
+              <a:t> that are </a:t>
+            </a:r>
+            <a:r>
+              <a:rPr b="1" lang="en">
+                <a:solidFill>
+                  <a:srgbClr val="DCB439"/>
+                </a:solidFill>
+              </a:rPr>
+              <a:t>ideally representative of the population</a:t>
+            </a:r>
+            <a:r>
+              <a:rPr lang="en"/>
+              <a:t> we’re interested in</a:t>
             </a:r>
             <a:endParaRPr/>
           </a:p>
@@ -12600,123 +12580,14 @@
             <a:r>
               <a:t/>
             </a:r>
-            <a:endParaRPr/>
-          </a:p>
-          <a:p>
-            <a:pPr indent="0" lvl="0" marL="0" rtl="0" algn="l">
-              <a:lnSpc>
-                <a:spcPct val="100000"/>
-              </a:lnSpc>
-              <a:spcBef>
-                <a:spcPts val="600"/>
-              </a:spcBef>
-              <a:spcAft>
-                <a:spcPts val="0"/>
-              </a:spcAft>
-              <a:buSzPts val="3000"/>
-              <a:buNone/>
-            </a:pPr>
-            <a:r>
-              <a:t/>
-            </a:r>
-            <a:endParaRPr/>
-          </a:p>
-          <a:p>
-            <a:pPr indent="0" lvl="0" marL="0" rtl="0" algn="l">
-              <a:lnSpc>
-                <a:spcPct val="100000"/>
-              </a:lnSpc>
-              <a:spcBef>
-                <a:spcPts val="600"/>
-              </a:spcBef>
-              <a:spcAft>
-                <a:spcPts val="0"/>
-              </a:spcAft>
-              <a:buSzPts val="3000"/>
-              <a:buNone/>
-            </a:pPr>
-            <a:r>
-              <a:t/>
-            </a:r>
-            <a:endParaRPr/>
-          </a:p>
-          <a:p>
-            <a:pPr indent="0" lvl="0" marL="0" rtl="0" algn="l">
-              <a:lnSpc>
-                <a:spcPct val="100000"/>
-              </a:lnSpc>
-              <a:spcBef>
-                <a:spcPts val="600"/>
-              </a:spcBef>
-              <a:spcAft>
-                <a:spcPts val="0"/>
-              </a:spcAft>
-              <a:buSzPts val="3000"/>
-              <a:buNone/>
-            </a:pPr>
-            <a:r>
-              <a:t/>
-            </a:r>
-            <a:endParaRPr/>
-          </a:p>
-          <a:p>
-            <a:pPr indent="0" lvl="0" marL="0" rtl="0" algn="l">
-              <a:lnSpc>
-                <a:spcPct val="100000"/>
-              </a:lnSpc>
-              <a:spcBef>
-                <a:spcPts val="600"/>
-              </a:spcBef>
-              <a:spcAft>
-                <a:spcPts val="0"/>
-              </a:spcAft>
-              <a:buSzPts val="3000"/>
-              <a:buNone/>
-            </a:pPr>
-            <a:r>
-              <a:rPr lang="en"/>
-              <a:t>For our student </a:t>
-            </a:r>
-            <a:r>
-              <a:rPr b="1" lang="en">
-                <a:solidFill>
-                  <a:srgbClr val="5AABBC"/>
-                </a:solidFill>
-                <a:latin typeface="Consolas"/>
-                <a:ea typeface="Consolas"/>
-                <a:cs typeface="Consolas"/>
-                <a:sym typeface="Consolas"/>
-              </a:rPr>
-              <a:t>dataset</a:t>
-            </a:r>
-            <a:r>
-              <a:rPr lang="en"/>
-              <a:t>, our categories are: </a:t>
-            </a:r>
-            <a:r>
-              <a:rPr b="1" lang="en">
-                <a:solidFill>
-                  <a:srgbClr val="DCB439"/>
-                </a:solidFill>
-              </a:rPr>
-              <a:t>“Will Graduate”</a:t>
-            </a:r>
-            <a:r>
-              <a:rPr lang="en"/>
-              <a:t> and </a:t>
-            </a:r>
-            <a:r>
-              <a:rPr b="1" lang="en">
-                <a:solidFill>
-                  <a:srgbClr val="DCB439"/>
-                </a:solidFill>
-              </a:rPr>
-              <a:t>“Will not graduate”</a:t>
-            </a:r>
-            <a:endParaRPr b="1">
+            <a:endParaRPr>
               <a:solidFill>
-                <a:srgbClr val="DCB439"/>
+                <a:srgbClr val="5AABBC"/>
               </a:solidFill>
+              <a:latin typeface="Consolas"/>
+              <a:ea typeface="Consolas"/>
+              <a:cs typeface="Consolas"/>
+              <a:sym typeface="Consolas"/>
             </a:endParaRPr>
           </a:p>
           <a:p>
@@ -12775,7 +12646,7 @@
       </p:grpSpPr>
       <p:sp>
         <p:nvSpPr>
-          <p:cNvPr id="197" name="Google Shape;197;g3bbeee67e43_0_142"/>
+          <p:cNvPr id="197" name="Google Shape;197;g3bbeee67e43_0_126"/>
           <p:cNvSpPr txBox="1"/>
           <p:nvPr>
             <p:ph type="title"/>
@@ -12818,32 +12689,28 @@
                 <a:solidFill>
                   <a:srgbClr val="A31415"/>
                 </a:solidFill>
-              </a:rPr>
-              <a:t>Machine</a:t>
-            </a:r>
-            <a:r>
-              <a:rPr lang="en">
-                <a:solidFill>
-                  <a:srgbClr val="A31415"/>
-                </a:solidFill>
-              </a:rPr>
-              <a:t> Learning</a:t>
-            </a:r>
-            <a:r>
-              <a:rPr lang="en"/>
-              <a:t>: </a:t>
-            </a:r>
-            <a:r>
-              <a:rPr lang="en">
-                <a:solidFill>
-                  <a:srgbClr val="5AABBC"/>
-                </a:solidFill>
                 <a:latin typeface="Consolas"/>
                 <a:ea typeface="Consolas"/>
                 <a:cs typeface="Consolas"/>
                 <a:sym typeface="Consolas"/>
               </a:rPr>
-              <a:t>Supervised Learning</a:t>
+              <a:t>Deep Learning</a:t>
+            </a:r>
+            <a:r>
+              <a:rPr lang="en"/>
+              <a:t>: </a:t>
+            </a:r>
+            <a:r>
+              <a:rPr lang="en">
+                <a:solidFill>
+                  <a:srgbClr val="5AABBC"/>
+                </a:solidFill>
+                <a:latin typeface="Consolas"/>
+                <a:ea typeface="Consolas"/>
+                <a:cs typeface="Consolas"/>
+                <a:sym typeface="Consolas"/>
+              </a:rPr>
+              <a:t>features</a:t>
             </a:r>
             <a:endParaRPr>
               <a:solidFill>
@@ -12859,7 +12726,7 @@
       </p:sp>
       <p:sp>
         <p:nvSpPr>
-          <p:cNvPr id="198" name="Google Shape;198;g3bbeee67e43_0_142"/>
+          <p:cNvPr id="198" name="Google Shape;198;g3bbeee67e43_0_126"/>
           <p:cNvSpPr txBox="1"/>
           <p:nvPr>
             <p:ph idx="1" type="body"/>
@@ -12868,7 +12735,7 @@
         <p:spPr>
           <a:xfrm>
             <a:off x="457200" y="1600200"/>
-            <a:ext cx="8229600" cy="2440800"/>
+            <a:ext cx="8229600" cy="4967700"/>
           </a:xfrm>
           <a:prstGeom prst="rect">
             <a:avLst/>
@@ -12899,7 +12766,19 @@
             </a:pPr>
             <a:r>
               <a:rPr lang="en"/>
-              <a:t>We call it </a:t>
+              <a:t>In </a:t>
+            </a:r>
+            <a:r>
+              <a:rPr b="1" lang="en">
+                <a:solidFill>
+                  <a:srgbClr val="A31515"/>
+                </a:solidFill>
+              </a:rPr>
+              <a:t>deep learning</a:t>
+            </a:r>
+            <a:r>
+              <a:rPr lang="en"/>
+              <a:t>, a </a:t>
             </a:r>
             <a:r>
               <a:rPr b="1" lang="en">
@@ -12911,11 +12790,11 @@
                 <a:cs typeface="Consolas"/>
                 <a:sym typeface="Consolas"/>
               </a:rPr>
-              <a:t>supervised learning</a:t>
+              <a:t>feature</a:t>
             </a:r>
             <a:r>
               <a:rPr lang="en"/>
-              <a:t> when we have examples of the correct answer in our </a:t>
+              <a:t> is a way to describe a </a:t>
             </a:r>
             <a:r>
               <a:rPr b="1" lang="en">
@@ -12927,23 +12806,7 @@
                 <a:cs typeface="Consolas"/>
                 <a:sym typeface="Consolas"/>
               </a:rPr>
-              <a:t>dataset</a:t>
-            </a:r>
-            <a:r>
-              <a:rPr lang="en"/>
-              <a:t>, because we can tell our model if it guessed correctly or not. We call these correct answers </a:t>
-            </a:r>
-            <a:r>
-              <a:rPr b="1" lang="en">
-                <a:solidFill>
-                  <a:srgbClr val="5AABBC"/>
-                </a:solidFill>
-                <a:latin typeface="Consolas"/>
-                <a:ea typeface="Consolas"/>
-                <a:cs typeface="Consolas"/>
-                <a:sym typeface="Consolas"/>
-              </a:rPr>
-              <a:t>ground truth</a:t>
+              <a:t>sample</a:t>
             </a:r>
             <a:endParaRPr b="1">
               <a:solidFill>
@@ -12981,6 +12844,42 @@
               <a:cs typeface="Consolas"/>
               <a:sym typeface="Consolas"/>
             </a:endParaRPr>
+          </a:p>
+          <a:p>
+            <a:pPr indent="0" lvl="0" marL="0" rtl="0" algn="l">
+              <a:lnSpc>
+                <a:spcPct val="100000"/>
+              </a:lnSpc>
+              <a:spcBef>
+                <a:spcPts val="600"/>
+              </a:spcBef>
+              <a:spcAft>
+                <a:spcPts val="0"/>
+              </a:spcAft>
+              <a:buSzPts val="3000"/>
+              <a:buNone/>
+            </a:pPr>
+            <a:r>
+              <a:rPr lang="en"/>
+              <a:t>A </a:t>
+            </a:r>
+            <a:r>
+              <a:rPr b="1" lang="en">
+                <a:solidFill>
+                  <a:srgbClr val="5AABBC"/>
+                </a:solidFill>
+                <a:latin typeface="Consolas"/>
+                <a:ea typeface="Consolas"/>
+                <a:cs typeface="Consolas"/>
+                <a:sym typeface="Consolas"/>
+              </a:rPr>
+              <a:t>sample</a:t>
+            </a:r>
+            <a:r>
+              <a:rPr lang="en"/>
+              <a:t> is one individual “thing” in our dataset. Maybe a bird, a flower, or a person.</a:t>
+            </a:r>
+            <a:endParaRPr/>
           </a:p>
         </p:txBody>
       </p:sp>
@@ -13011,7 +12910,7 @@
       </p:grpSpPr>
       <p:sp>
         <p:nvSpPr>
-          <p:cNvPr id="203" name="Google Shape;203;g3bbeee67e43_0_126"/>
+          <p:cNvPr id="203" name="Google Shape;203;g3bbeee67e43_0_132"/>
           <p:cNvSpPr txBox="1"/>
           <p:nvPr>
             <p:ph type="title"/>
@@ -13054,28 +12953,24 @@
                 <a:solidFill>
                   <a:srgbClr val="A31415"/>
                 </a:solidFill>
+              </a:rPr>
+              <a:t>Deep Learning</a:t>
+            </a:r>
+            <a:r>
+              <a:rPr lang="en"/>
+              <a:t>: </a:t>
+            </a:r>
+            <a:r>
+              <a:rPr lang="en">
+                <a:solidFill>
+                  <a:srgbClr val="5AABBC"/>
+                </a:solidFill>
                 <a:latin typeface="Consolas"/>
                 <a:ea typeface="Consolas"/>
                 <a:cs typeface="Consolas"/>
                 <a:sym typeface="Consolas"/>
               </a:rPr>
-              <a:t>Deep Learning</a:t>
-            </a:r>
-            <a:r>
-              <a:rPr lang="en"/>
-              <a:t>: </a:t>
-            </a:r>
-            <a:r>
-              <a:rPr lang="en">
-                <a:solidFill>
-                  <a:srgbClr val="5AABBC"/>
-                </a:solidFill>
-                <a:latin typeface="Consolas"/>
-                <a:ea typeface="Consolas"/>
-                <a:cs typeface="Consolas"/>
-                <a:sym typeface="Consolas"/>
-              </a:rPr>
-              <a:t>features</a:t>
+              <a:t>feature vector</a:t>
             </a:r>
             <a:endParaRPr>
               <a:solidFill>
@@ -13091,7 +12986,7 @@
       </p:sp>
       <p:sp>
         <p:nvSpPr>
-          <p:cNvPr id="204" name="Google Shape;204;g3bbeee67e43_0_126"/>
+          <p:cNvPr id="204" name="Google Shape;204;g3bbeee67e43_0_132"/>
           <p:cNvSpPr txBox="1"/>
           <p:nvPr>
             <p:ph idx="1" type="body"/>
@@ -13131,19 +13026,7 @@
             </a:pPr>
             <a:r>
               <a:rPr lang="en"/>
-              <a:t>In </a:t>
-            </a:r>
-            <a:r>
-              <a:rPr b="1" lang="en">
-                <a:solidFill>
-                  <a:srgbClr val="A31515"/>
-                </a:solidFill>
-              </a:rPr>
-              <a:t>deep learning</a:t>
-            </a:r>
-            <a:r>
-              <a:rPr lang="en"/>
-              <a:t>, a </a:t>
+              <a:t>A </a:t>
             </a:r>
             <a:r>
               <a:rPr b="1" lang="en">
@@ -13155,11 +13038,11 @@
                 <a:cs typeface="Consolas"/>
                 <a:sym typeface="Consolas"/>
               </a:rPr>
-              <a:t>feature</a:t>
+              <a:t>feature vector</a:t>
             </a:r>
             <a:r>
               <a:rPr lang="en"/>
-              <a:t> is a way to describe a </a:t>
+              <a:t> then is a representation of a </a:t>
             </a:r>
             <a:r>
               <a:rPr b="1" lang="en">
@@ -13171,17 +13054,13 @@
                 <a:cs typeface="Consolas"/>
                 <a:sym typeface="Consolas"/>
               </a:rPr>
-              <a:t>sample</a:t>
-            </a:r>
-            <a:endParaRPr b="1">
-              <a:solidFill>
-                <a:srgbClr val="5AABBC"/>
-              </a:solidFill>
-              <a:latin typeface="Consolas"/>
-              <a:ea typeface="Consolas"/>
-              <a:cs typeface="Consolas"/>
-              <a:sym typeface="Consolas"/>
-            </a:endParaRPr>
+              <a:t>sample </a:t>
+            </a:r>
+            <a:r>
+              <a:rPr lang="en"/>
+              <a:t>in some high-dimensional space</a:t>
+            </a:r>
+            <a:endParaRPr/>
           </a:p>
           <a:p>
             <a:pPr indent="0" lvl="0" marL="0" rtl="0" algn="l">
@@ -13225,26 +13104,17 @@
               <a:buNone/>
             </a:pPr>
             <a:r>
-              <a:rPr lang="en"/>
-              <a:t>A </a:t>
-            </a:r>
-            <a:r>
-              <a:rPr b="1" lang="en">
-                <a:solidFill>
-                  <a:srgbClr val="5AABBC"/>
-                </a:solidFill>
-                <a:latin typeface="Consolas"/>
-                <a:ea typeface="Consolas"/>
-                <a:cs typeface="Consolas"/>
-                <a:sym typeface="Consolas"/>
-              </a:rPr>
-              <a:t>sample</a:t>
-            </a:r>
-            <a:r>
-              <a:rPr lang="en"/>
-              <a:t> is one individual “thing” in our dataset. Maybe a bird, a flower, or a person.</a:t>
-            </a:r>
-            <a:endParaRPr/>
+              <a:t/>
+            </a:r>
+            <a:endParaRPr>
+              <a:solidFill>
+                <a:srgbClr val="5AABBC"/>
+              </a:solidFill>
+              <a:latin typeface="Consolas"/>
+              <a:ea typeface="Consolas"/>
+              <a:cs typeface="Consolas"/>
+              <a:sym typeface="Consolas"/>
+            </a:endParaRPr>
           </a:p>
         </p:txBody>
       </p:sp>
@@ -13275,7 +13145,7 @@
       </p:grpSpPr>
       <p:sp>
         <p:nvSpPr>
-          <p:cNvPr id="209" name="Google Shape;209;g3bbeee67e43_0_132"/>
+          <p:cNvPr id="209" name="Google Shape;209;g3bbeee67e43_0_147"/>
           <p:cNvSpPr txBox="1"/>
           <p:nvPr>
             <p:ph type="title"/>
@@ -13319,7 +13189,15 @@
                   <a:srgbClr val="A31415"/>
                 </a:solidFill>
               </a:rPr>
-              <a:t>Deep Learning</a:t>
+              <a:t>Machine</a:t>
+            </a:r>
+            <a:r>
+              <a:rPr lang="en">
+                <a:solidFill>
+                  <a:srgbClr val="A31415"/>
+                </a:solidFill>
+              </a:rPr>
+              <a:t> Learning</a:t>
             </a:r>
             <a:r>
               <a:rPr lang="en"/>
@@ -13335,7 +13213,7 @@
                 <a:cs typeface="Consolas"/>
                 <a:sym typeface="Consolas"/>
               </a:rPr>
-              <a:t>feature vector</a:t>
+              <a:t>Classification</a:t>
             </a:r>
             <a:endParaRPr>
               <a:solidFill>
@@ -13351,7 +13229,7 @@
       </p:sp>
       <p:sp>
         <p:nvSpPr>
-          <p:cNvPr id="210" name="Google Shape;210;g3bbeee67e43_0_132"/>
+          <p:cNvPr id="210" name="Google Shape;210;g3bbeee67e43_0_147"/>
           <p:cNvSpPr txBox="1"/>
           <p:nvPr>
             <p:ph idx="1" type="body"/>
@@ -13360,7 +13238,7 @@
         <p:spPr>
           <a:xfrm>
             <a:off x="457200" y="1600200"/>
-            <a:ext cx="8229600" cy="4967700"/>
+            <a:ext cx="8229600" cy="4788300"/>
           </a:xfrm>
           <a:prstGeom prst="rect">
             <a:avLst/>
@@ -13391,7 +13269,19 @@
             </a:pPr>
             <a:r>
               <a:rPr lang="en"/>
-              <a:t>A </a:t>
+              <a:t>In </a:t>
+            </a:r>
+            <a:r>
+              <a:rPr b="1" lang="en">
+                <a:solidFill>
+                  <a:srgbClr val="A31515"/>
+                </a:solidFill>
+              </a:rPr>
+              <a:t>machine learning</a:t>
+            </a:r>
+            <a:r>
+              <a:rPr lang="en"/>
+              <a:t>, a </a:t>
             </a:r>
             <a:r>
               <a:rPr b="1" lang="en">
@@ -13403,11 +13293,39 @@
                 <a:cs typeface="Consolas"/>
                 <a:sym typeface="Consolas"/>
               </a:rPr>
-              <a:t>feature vector</a:t>
+              <a:t>classification</a:t>
+            </a:r>
+            <a:r>
+              <a:rPr b="1" lang="en"/>
+              <a:t> </a:t>
             </a:r>
             <a:r>
               <a:rPr lang="en"/>
-              <a:t> then is a representation of a </a:t>
+              <a:t>task</a:t>
+            </a:r>
+            <a:r>
+              <a:rPr lang="en"/>
+              <a:t> is one in which we’re </a:t>
+            </a:r>
+            <a:r>
+              <a:rPr lang="en"/>
+              <a:t>trying</a:t>
+            </a:r>
+            <a:r>
+              <a:rPr lang="en"/>
+              <a:t> to </a:t>
+            </a:r>
+            <a:r>
+              <a:rPr b="1" lang="en">
+                <a:solidFill>
+                  <a:srgbClr val="465510"/>
+                </a:solidFill>
+              </a:rPr>
+              <a:t>predict a category or label</a:t>
+            </a:r>
+            <a:r>
+              <a:rPr lang="en"/>
+              <a:t> given a </a:t>
             </a:r>
             <a:r>
               <a:rPr b="1" lang="en">
@@ -13419,11 +13337,11 @@
                 <a:cs typeface="Consolas"/>
                 <a:sym typeface="Consolas"/>
               </a:rPr>
-              <a:t>sample </a:t>
+              <a:t>sample</a:t>
             </a:r>
             <a:r>
               <a:rPr lang="en"/>
-              <a:t>in some high-dimensional space</a:t>
+              <a:t>.</a:t>
             </a:r>
             <a:endParaRPr/>
           </a:p>
@@ -13444,14 +13362,123 @@
             <a:r>
               <a:t/>
             </a:r>
-            <a:endParaRPr>
+            <a:endParaRPr/>
+          </a:p>
+          <a:p>
+            <a:pPr indent="0" lvl="0" marL="0" rtl="0" algn="l">
+              <a:lnSpc>
+                <a:spcPct val="100000"/>
+              </a:lnSpc>
+              <a:spcBef>
+                <a:spcPts val="600"/>
+              </a:spcBef>
+              <a:spcAft>
+                <a:spcPts val="0"/>
+              </a:spcAft>
+              <a:buSzPts val="3000"/>
+              <a:buNone/>
+            </a:pPr>
+            <a:r>
+              <a:t/>
+            </a:r>
+            <a:endParaRPr/>
+          </a:p>
+          <a:p>
+            <a:pPr indent="0" lvl="0" marL="0" rtl="0" algn="l">
+              <a:lnSpc>
+                <a:spcPct val="100000"/>
+              </a:lnSpc>
+              <a:spcBef>
+                <a:spcPts val="600"/>
+              </a:spcBef>
+              <a:spcAft>
+                <a:spcPts val="0"/>
+              </a:spcAft>
+              <a:buSzPts val="3000"/>
+              <a:buNone/>
+            </a:pPr>
+            <a:r>
+              <a:t/>
+            </a:r>
+            <a:endParaRPr/>
+          </a:p>
+          <a:p>
+            <a:pPr indent="0" lvl="0" marL="0" rtl="0" algn="l">
+              <a:lnSpc>
+                <a:spcPct val="100000"/>
+              </a:lnSpc>
+              <a:spcBef>
+                <a:spcPts val="600"/>
+              </a:spcBef>
+              <a:spcAft>
+                <a:spcPts val="0"/>
+              </a:spcAft>
+              <a:buSzPts val="3000"/>
+              <a:buNone/>
+            </a:pPr>
+            <a:r>
+              <a:t/>
+            </a:r>
+            <a:endParaRPr/>
+          </a:p>
+          <a:p>
+            <a:pPr indent="0" lvl="0" marL="0" rtl="0" algn="l">
+              <a:lnSpc>
+                <a:spcPct val="100000"/>
+              </a:lnSpc>
+              <a:spcBef>
+                <a:spcPts val="600"/>
+              </a:spcBef>
+              <a:spcAft>
+                <a:spcPts val="0"/>
+              </a:spcAft>
+              <a:buSzPts val="3000"/>
+              <a:buNone/>
+            </a:pPr>
+            <a:r>
+              <a:rPr lang="en"/>
+              <a:t>For our student </a:t>
+            </a:r>
+            <a:r>
+              <a:rPr b="1" lang="en">
+                <a:solidFill>
+                  <a:srgbClr val="5AABBC"/>
+                </a:solidFill>
+                <a:latin typeface="Consolas"/>
+                <a:ea typeface="Consolas"/>
+                <a:cs typeface="Consolas"/>
+                <a:sym typeface="Consolas"/>
+              </a:rPr>
+              <a:t>dataset</a:t>
+            </a:r>
+            <a:r>
+              <a:rPr lang="en"/>
+              <a:t>, our categories are: </a:t>
+            </a:r>
+            <a:r>
+              <a:rPr b="1" lang="en">
+                <a:solidFill>
+                  <a:srgbClr val="DCB439"/>
+                </a:solidFill>
+              </a:rPr>
+              <a:t>“Will Graduate”</a:t>
+            </a:r>
+            <a:r>
+              <a:rPr lang="en"/>
+              <a:t> and </a:t>
+            </a:r>
+            <a:r>
+              <a:rPr b="1" lang="en">
+                <a:solidFill>
+                  <a:srgbClr val="DCB439"/>
+                </a:solidFill>
+              </a:rPr>
+              <a:t>“Will not graduate”</a:t>
+            </a:r>
+            <a:endParaRPr b="1">
               <a:solidFill>
-                <a:srgbClr val="5AABBC"/>
+                <a:srgbClr val="DCB439"/>
               </a:solidFill>
-              <a:latin typeface="Consolas"/>
-              <a:ea typeface="Consolas"/>
-              <a:cs typeface="Consolas"/>
-              <a:sym typeface="Consolas"/>
             </a:endParaRPr>
           </a:p>
           <a:p>
@@ -13510,7 +13537,7 @@
       </p:grpSpPr>
       <p:sp>
         <p:nvSpPr>
-          <p:cNvPr id="215" name="Google Shape;215;g3bbeee67e43_0_137"/>
+          <p:cNvPr id="215" name="Google Shape;215;g3bbeee67e43_0_142"/>
           <p:cNvSpPr txBox="1"/>
           <p:nvPr>
             <p:ph type="title"/>
@@ -13554,7 +13581,15 @@
                   <a:srgbClr val="A31415"/>
                 </a:solidFill>
               </a:rPr>
-              <a:t>Deep Learning</a:t>
+              <a:t>Machine</a:t>
+            </a:r>
+            <a:r>
+              <a:rPr lang="en">
+                <a:solidFill>
+                  <a:srgbClr val="A31415"/>
+                </a:solidFill>
+              </a:rPr>
+              <a:t> Learning</a:t>
             </a:r>
             <a:r>
               <a:rPr lang="en"/>
@@ -13570,7 +13605,7 @@
                 <a:cs typeface="Consolas"/>
                 <a:sym typeface="Consolas"/>
               </a:rPr>
-              <a:t>Dataset</a:t>
+              <a:t>Supervised Learning</a:t>
             </a:r>
             <a:endParaRPr>
               <a:solidFill>
@@ -13586,7 +13621,7 @@
       </p:sp>
       <p:sp>
         <p:nvSpPr>
-          <p:cNvPr id="216" name="Google Shape;216;g3bbeee67e43_0_137"/>
+          <p:cNvPr id="216" name="Google Shape;216;g3bbeee67e43_0_142"/>
           <p:cNvSpPr txBox="1"/>
           <p:nvPr>
             <p:ph idx="1" type="body"/>
@@ -13595,7 +13630,7 @@
         <p:spPr>
           <a:xfrm>
             <a:off x="457200" y="1600200"/>
-            <a:ext cx="8229600" cy="1728600"/>
+            <a:ext cx="8229600" cy="2440800"/>
           </a:xfrm>
           <a:prstGeom prst="rect">
             <a:avLst/>
@@ -13626,7 +13661,7 @@
             </a:pPr>
             <a:r>
               <a:rPr lang="en"/>
-              <a:t>A </a:t>
+              <a:t>We call it </a:t>
             </a:r>
             <a:r>
               <a:rPr b="1" lang="en">
@@ -13638,11 +13673,11 @@
                 <a:cs typeface="Consolas"/>
                 <a:sym typeface="Consolas"/>
               </a:rPr>
-              <a:t>dataset </a:t>
+              <a:t>supervised learning</a:t>
             </a:r>
             <a:r>
               <a:rPr lang="en"/>
-              <a:t>is a collection of </a:t>
+              <a:t> when we have examples of the correct answer in our </a:t>
             </a:r>
             <a:r>
               <a:rPr b="1" lang="en">
@@ -13654,11 +13689,23 @@
                 <a:cs typeface="Consolas"/>
                 <a:sym typeface="Consolas"/>
               </a:rPr>
-              <a:t>feature vectors</a:t>
+              <a:t>dataset</a:t>
             </a:r>
             <a:r>
               <a:rPr lang="en"/>
-              <a:t> for </a:t>
+              <a:t>, because </a:t>
+            </a:r>
+            <a:r>
+              <a:rPr b="1" lang="en">
+                <a:solidFill>
+                  <a:srgbClr val="465510"/>
+                </a:solidFill>
+              </a:rPr>
+              <a:t>we can tell our model if it guessed correctly or not</a:t>
+            </a:r>
+            <a:r>
+              <a:rPr lang="en"/>
+              <a:t>. We call these correct answers </a:t>
             </a:r>
             <a:r>
               <a:rPr b="1" lang="en">
@@ -13670,44 +13717,9 @@
                 <a:cs typeface="Consolas"/>
                 <a:sym typeface="Consolas"/>
               </a:rPr>
-              <a:t>samples</a:t>
-            </a:r>
-            <a:r>
-              <a:rPr lang="en"/>
-              <a:t> that are </a:t>
-            </a:r>
-            <a:r>
-              <a:rPr b="1" lang="en">
-                <a:solidFill>
-                  <a:srgbClr val="DCB439"/>
-                </a:solidFill>
-              </a:rPr>
-              <a:t>ideally representative of the population</a:t>
-            </a:r>
-            <a:r>
-              <a:rPr lang="en"/>
-              <a:t> we’re interested in</a:t>
-            </a:r>
-            <a:endParaRPr/>
-          </a:p>
-          <a:p>
-            <a:pPr indent="0" lvl="0" marL="0" rtl="0" algn="l">
-              <a:lnSpc>
-                <a:spcPct val="100000"/>
-              </a:lnSpc>
-              <a:spcBef>
-                <a:spcPts val="600"/>
-              </a:spcBef>
-              <a:spcAft>
-                <a:spcPts val="0"/>
-              </a:spcAft>
-              <a:buSzPts val="3000"/>
-              <a:buNone/>
-            </a:pPr>
-            <a:r>
-              <a:t/>
-            </a:r>
-            <a:endParaRPr>
+              <a:t>ground truth</a:t>
+            </a:r>
+            <a:endParaRPr b="1">
               <a:solidFill>
                 <a:srgbClr val="5AABBC"/>
               </a:solidFill>
@@ -17151,6 +17163,285 @@
 </file>
 
 <file path=ppt/theme/theme1.xml><?xml version="1.0" encoding="utf-8"?>
+<a:theme xmlns:a="http://schemas.openxmlformats.org/drawingml/2006/main" xmlns:r="http://schemas.openxmlformats.org/officeDocument/2006/relationships" name="PB Theme">
+  <a:themeElements>
+    <a:clrScheme name="Custom 347">
+      <a:dk1>
+        <a:srgbClr val="000000"/>
+      </a:dk1>
+      <a:lt1>
+        <a:srgbClr val="FFFFFF"/>
+      </a:lt1>
+      <a:dk2>
+        <a:srgbClr val="666666"/>
+      </a:dk2>
+      <a:lt2>
+        <a:srgbClr val="CCCCCC"/>
+      </a:lt2>
+      <a:accent1>
+        <a:srgbClr val="3A81BA"/>
+      </a:accent1>
+      <a:accent2>
+        <a:srgbClr val="D89F39"/>
+      </a:accent2>
+      <a:accent3>
+        <a:srgbClr val="8BAB42"/>
+      </a:accent3>
+      <a:accent4>
+        <a:srgbClr val="57A7B5"/>
+      </a:accent4>
+      <a:accent5>
+        <a:srgbClr val="8B81D2"/>
+      </a:accent5>
+      <a:accent6>
+        <a:srgbClr val="963334"/>
+      </a:accent6>
+      <a:hlink>
+        <a:srgbClr val="1155CC"/>
+      </a:hlink>
+      <a:folHlink>
+        <a:srgbClr val="6611CC"/>
+      </a:folHlink>
+    </a:clrScheme>
+    <a:fontScheme name="Office">
+      <a:majorFont>
+        <a:latin typeface="Arial"/>
+        <a:ea typeface=""/>
+        <a:cs typeface=""/>
+        <a:font script="Jpan" typeface="ＭＳ Ｐゴシック"/>
+        <a:font script="Hang" typeface="맑은 고딕"/>
+        <a:font script="Hans" typeface="宋体"/>
+        <a:font script="Hant" typeface="新細明體"/>
+        <a:font script="Arab" typeface="Times New Roman"/>
+        <a:font script="Hebr" typeface="Times New Roman"/>
+        <a:font script="Thai" typeface="Angsana New"/>
+        <a:font script="Ethi" typeface="Nyala"/>
+        <a:font script="Beng" typeface="Vrinda"/>
+        <a:font script="Gujr" typeface="Shruti"/>
+        <a:font script="Khmr" typeface="MoolBoran"/>
+        <a:font script="Knda" typeface="Tunga"/>
+        <a:font script="Guru" typeface="Raavi"/>
+        <a:font script="Cans" typeface="Euphemia"/>
+        <a:font script="Cher" typeface="Plantagenet Cherokee"/>
+        <a:font script="Yiii" typeface="Microsoft Yi Baiti"/>
+        <a:font script="Tibt" typeface="Microsoft Himalaya"/>
+        <a:font script="Thaa" typeface="MV Boli"/>
+        <a:font script="Deva" typeface="Mangal"/>
+        <a:font script="Telu" typeface="Gautami"/>
+        <a:font script="Taml" typeface="Latha"/>
+        <a:font script="Syrc" typeface="Estrangelo Edessa"/>
+        <a:font script="Orya" typeface="Kalinga"/>
+        <a:font script="Mlym" typeface="Kartika"/>
+        <a:font script="Laoo" typeface="DokChampa"/>
+        <a:font script="Sinh" typeface="Iskoola Pota"/>
+        <a:font script="Mong" typeface="Mongolian Baiti"/>
+        <a:font script="Viet" typeface="Times New Roman"/>
+        <a:font script="Uigh" typeface="Microsoft Uighur"/>
+        <a:font script="Geor" typeface="Sylfaen"/>
+      </a:majorFont>
+      <a:minorFont>
+        <a:latin typeface="Arial"/>
+        <a:ea typeface=""/>
+        <a:cs typeface=""/>
+        <a:font script="Jpan" typeface="ＭＳ Ｐゴシック"/>
+        <a:font script="Hang" typeface="맑은 고딕"/>
+        <a:font script="Hans" typeface="宋体"/>
+        <a:font script="Hant" typeface="新細明體"/>
+        <a:font script="Arab" typeface="Arial"/>
+        <a:font script="Hebr" typeface="Arial"/>
+        <a:font script="Thai" typeface="Cordia New"/>
+        <a:font script="Ethi" typeface="Nyala"/>
+        <a:font script="Beng" typeface="Vrinda"/>
+        <a:font script="Gujr" typeface="Shruti"/>
+        <a:font script="Khmr" typeface="DaunPenh"/>
+        <a:font script="Knda" typeface="Tunga"/>
+        <a:font script="Guru" typeface="Raavi"/>
+        <a:font script="Cans" typeface="Euphemia"/>
+        <a:font script="Cher" typeface="Plantagenet Cherokee"/>
+        <a:font script="Yiii" typeface="Microsoft Yi Baiti"/>
+        <a:font script="Tibt" typeface="Microsoft Himalaya"/>
+        <a:font script="Thaa" typeface="MV Boli"/>
+        <a:font script="Deva" typeface="Mangal"/>
+        <a:font script="Telu" typeface="Gautami"/>
+        <a:font script="Taml" typeface="Latha"/>
+        <a:font script="Syrc" typeface="Estrangelo Edessa"/>
+        <a:font script="Orya" typeface="Kalinga"/>
+        <a:font script="Mlym" typeface="Kartika"/>
+        <a:font script="Laoo" typeface="DokChampa"/>
+        <a:font script="Sinh" typeface="Iskoola Pota"/>
+        <a:font script="Mong" typeface="Mongolian Baiti"/>
+        <a:font script="Viet" typeface="Arial"/>
+        <a:font script="Uigh" typeface="Microsoft Uighur"/>
+        <a:font script="Geor" typeface="Sylfaen"/>
+      </a:minorFont>
+    </a:fontScheme>
+    <a:fmtScheme name="Office">
+      <a:fillStyleLst>
+        <a:solidFill>
+          <a:schemeClr val="phClr"/>
+        </a:solidFill>
+        <a:gradFill rotWithShape="1">
+          <a:gsLst>
+            <a:gs pos="0">
+              <a:schemeClr val="phClr">
+                <a:tint val="50000"/>
+                <a:satMod val="300000"/>
+              </a:schemeClr>
+            </a:gs>
+            <a:gs pos="35000">
+              <a:schemeClr val="phClr">
+                <a:tint val="37000"/>
+                <a:satMod val="300000"/>
+              </a:schemeClr>
+            </a:gs>
+            <a:gs pos="100000">
+              <a:schemeClr val="phClr">
+                <a:tint val="15000"/>
+                <a:satMod val="350000"/>
+              </a:schemeClr>
+            </a:gs>
+          </a:gsLst>
+          <a:lin ang="16200000" scaled="1"/>
+        </a:gradFill>
+        <a:gradFill rotWithShape="1">
+          <a:gsLst>
+            <a:gs pos="0">
+              <a:schemeClr val="phClr">
+                <a:tint val="100000"/>
+                <a:shade val="100000"/>
+                <a:satMod val="130000"/>
+              </a:schemeClr>
+            </a:gs>
+            <a:gs pos="100000">
+              <a:schemeClr val="phClr">
+                <a:tint val="50000"/>
+                <a:shade val="100000"/>
+                <a:satMod val="350000"/>
+              </a:schemeClr>
+            </a:gs>
+          </a:gsLst>
+          <a:lin ang="16200000" scaled="0"/>
+        </a:gradFill>
+      </a:fillStyleLst>
+      <a:lnStyleLst>
+        <a:ln w="9525" cap="flat" cmpd="sng" algn="ctr">
+          <a:solidFill>
+            <a:schemeClr val="phClr">
+              <a:shade val="95000"/>
+              <a:satMod val="105000"/>
+            </a:schemeClr>
+          </a:solidFill>
+          <a:prstDash val="solid"/>
+        </a:ln>
+        <a:ln w="25400" cap="flat" cmpd="sng" algn="ctr">
+          <a:solidFill>
+            <a:schemeClr val="phClr"/>
+          </a:solidFill>
+          <a:prstDash val="solid"/>
+        </a:ln>
+        <a:ln w="38100" cap="flat" cmpd="sng" algn="ctr">
+          <a:solidFill>
+            <a:schemeClr val="phClr"/>
+          </a:solidFill>
+          <a:prstDash val="solid"/>
+        </a:ln>
+      </a:lnStyleLst>
+      <a:effectStyleLst>
+        <a:effectStyle>
+          <a:effectLst>
+            <a:outerShdw blurRad="40000" dist="20000" dir="5400000" rotWithShape="0">
+              <a:srgbClr val="000000">
+                <a:alpha val="38000"/>
+              </a:srgbClr>
+            </a:outerShdw>
+          </a:effectLst>
+        </a:effectStyle>
+        <a:effectStyle>
+          <a:effectLst>
+            <a:outerShdw blurRad="40000" dist="23000" dir="5400000" rotWithShape="0">
+              <a:srgbClr val="000000">
+                <a:alpha val="35000"/>
+              </a:srgbClr>
+            </a:outerShdw>
+          </a:effectLst>
+        </a:effectStyle>
+        <a:effectStyle>
+          <a:effectLst>
+            <a:outerShdw blurRad="40000" dist="23000" dir="5400000" rotWithShape="0">
+              <a:srgbClr val="000000">
+                <a:alpha val="35000"/>
+              </a:srgbClr>
+            </a:outerShdw>
+          </a:effectLst>
+          <a:scene3d>
+            <a:camera prst="orthographicFront">
+              <a:rot lat="0" lon="0" rev="0"/>
+            </a:camera>
+            <a:lightRig rig="threePt" dir="t">
+              <a:rot lat="0" lon="0" rev="1200000"/>
+            </a:lightRig>
+          </a:scene3d>
+          <a:sp3d>
+            <a:bevelT w="63500" h="25400"/>
+          </a:sp3d>
+        </a:effectStyle>
+      </a:effectStyleLst>
+      <a:bgFillStyleLst>
+        <a:solidFill>
+          <a:schemeClr val="phClr"/>
+        </a:solidFill>
+        <a:gradFill rotWithShape="1">
+          <a:gsLst>
+            <a:gs pos="0">
+              <a:schemeClr val="phClr">
+                <a:tint val="40000"/>
+                <a:satMod val="350000"/>
+              </a:schemeClr>
+            </a:gs>
+            <a:gs pos="40000">
+              <a:schemeClr val="phClr">
+                <a:tint val="45000"/>
+                <a:shade val="99000"/>
+                <a:satMod val="350000"/>
+              </a:schemeClr>
+            </a:gs>
+            <a:gs pos="100000">
+              <a:schemeClr val="phClr">
+                <a:shade val="20000"/>
+                <a:satMod val="255000"/>
+              </a:schemeClr>
+            </a:gs>
+          </a:gsLst>
+          <a:path path="circle">
+            <a:fillToRect l="50000" t="-80000" r="50000" b="180000"/>
+          </a:path>
+        </a:gradFill>
+        <a:gradFill rotWithShape="1">
+          <a:gsLst>
+            <a:gs pos="0">
+              <a:schemeClr val="phClr">
+                <a:tint val="80000"/>
+                <a:satMod val="300000"/>
+              </a:schemeClr>
+            </a:gs>
+            <a:gs pos="100000">
+              <a:schemeClr val="phClr">
+                <a:shade val="30000"/>
+                <a:satMod val="200000"/>
+              </a:schemeClr>
+            </a:gs>
+          </a:gsLst>
+          <a:path path="circle">
+            <a:fillToRect l="50000" t="50000" r="50000" b="50000"/>
+          </a:path>
+        </a:gradFill>
+      </a:bgFillStyleLst>
+    </a:fmtScheme>
+  </a:themeElements>
+</a:theme>
+</file>
+
+<file path=ppt/theme/theme2.xml><?xml version="1.0" encoding="utf-8"?>
 <a:theme xmlns:a="http://schemas.openxmlformats.org/drawingml/2006/main" xmlns:r="http://schemas.openxmlformats.org/officeDocument/2006/relationships">
   <a:themeElements>
     <a:clrScheme name="Default">
@@ -17427,283 +17718,4 @@
     </a:fmtScheme>
   </a:themeElements>
 </a:theme>
-</file>
-
-<file path=ppt/theme/theme2.xml><?xml version="1.0" encoding="utf-8"?>
-<a:theme xmlns:a="http://schemas.openxmlformats.org/drawingml/2006/main" xmlns:r="http://schemas.openxmlformats.org/officeDocument/2006/relationships" name="PB Theme">
-  <a:themeElements>
-    <a:clrScheme name="Custom 347">
-      <a:dk1>
-        <a:srgbClr val="000000"/>
-      </a:dk1>
-      <a:lt1>
-        <a:srgbClr val="FFFFFF"/>
-      </a:lt1>
-      <a:dk2>
-        <a:srgbClr val="666666"/>
-      </a:dk2>
-      <a:lt2>
-        <a:srgbClr val="CCCCCC"/>
-      </a:lt2>
-      <a:accent1>
-        <a:srgbClr val="3A81BA"/>
-      </a:accent1>
-      <a:accent2>
-        <a:srgbClr val="D89F39"/>
-      </a:accent2>
-      <a:accent3>
-        <a:srgbClr val="8BAB42"/>
-      </a:accent3>
-      <a:accent4>
-        <a:srgbClr val="57A7B5"/>
-      </a:accent4>
-      <a:accent5>
-        <a:srgbClr val="8B81D2"/>
-      </a:accent5>
-      <a:accent6>
-        <a:srgbClr val="963334"/>
-      </a:accent6>
-      <a:hlink>
-        <a:srgbClr val="1155CC"/>
-      </a:hlink>
-      <a:folHlink>
-        <a:srgbClr val="6611CC"/>
-      </a:folHlink>
-    </a:clrScheme>
-    <a:fontScheme name="Office">
-      <a:majorFont>
-        <a:latin typeface="Arial"/>
-        <a:ea typeface=""/>
-        <a:cs typeface=""/>
-        <a:font script="Jpan" typeface="ＭＳ Ｐゴシック"/>
-        <a:font script="Hang" typeface="맑은 고딕"/>
-        <a:font script="Hans" typeface="宋体"/>
-        <a:font script="Hant" typeface="新細明體"/>
-        <a:font script="Arab" typeface="Times New Roman"/>
-        <a:font script="Hebr" typeface="Times New Roman"/>
-        <a:font script="Thai" typeface="Angsana New"/>
-        <a:font script="Ethi" typeface="Nyala"/>
-        <a:font script="Beng" typeface="Vrinda"/>
-        <a:font script="Gujr" typeface="Shruti"/>
-        <a:font script="Khmr" typeface="MoolBoran"/>
-        <a:font script="Knda" typeface="Tunga"/>
-        <a:font script="Guru" typeface="Raavi"/>
-        <a:font script="Cans" typeface="Euphemia"/>
-        <a:font script="Cher" typeface="Plantagenet Cherokee"/>
-        <a:font script="Yiii" typeface="Microsoft Yi Baiti"/>
-        <a:font script="Tibt" typeface="Microsoft Himalaya"/>
-        <a:font script="Thaa" typeface="MV Boli"/>
-        <a:font script="Deva" typeface="Mangal"/>
-        <a:font script="Telu" typeface="Gautami"/>
-        <a:font script="Taml" typeface="Latha"/>
-        <a:font script="Syrc" typeface="Estrangelo Edessa"/>
-        <a:font script="Orya" typeface="Kalinga"/>
-        <a:font script="Mlym" typeface="Kartika"/>
-        <a:font script="Laoo" typeface="DokChampa"/>
-        <a:font script="Sinh" typeface="Iskoola Pota"/>
-        <a:font script="Mong" typeface="Mongolian Baiti"/>
-        <a:font script="Viet" typeface="Times New Roman"/>
-        <a:font script="Uigh" typeface="Microsoft Uighur"/>
-        <a:font script="Geor" typeface="Sylfaen"/>
-      </a:majorFont>
-      <a:minorFont>
-        <a:latin typeface="Arial"/>
-        <a:ea typeface=""/>
-        <a:cs typeface=""/>
-        <a:font script="Jpan" typeface="ＭＳ Ｐゴシック"/>
-        <a:font script="Hang" typeface="맑은 고딕"/>
-        <a:font script="Hans" typeface="宋体"/>
-        <a:font script="Hant" typeface="新細明體"/>
-        <a:font script="Arab" typeface="Arial"/>
-        <a:font script="Hebr" typeface="Arial"/>
-        <a:font script="Thai" typeface="Cordia New"/>
-        <a:font script="Ethi" typeface="Nyala"/>
-        <a:font script="Beng" typeface="Vrinda"/>
-        <a:font script="Gujr" typeface="Shruti"/>
-        <a:font script="Khmr" typeface="DaunPenh"/>
-        <a:font script="Knda" typeface="Tunga"/>
-        <a:font script="Guru" typeface="Raavi"/>
-        <a:font script="Cans" typeface="Euphemia"/>
-        <a:font script="Cher" typeface="Plantagenet Cherokee"/>
-        <a:font script="Yiii" typeface="Microsoft Yi Baiti"/>
-        <a:font script="Tibt" typeface="Microsoft Himalaya"/>
-        <a:font script="Thaa" typeface="MV Boli"/>
-        <a:font script="Deva" typeface="Mangal"/>
-        <a:font script="Telu" typeface="Gautami"/>
-        <a:font script="Taml" typeface="Latha"/>
-        <a:font script="Syrc" typeface="Estrangelo Edessa"/>
-        <a:font script="Orya" typeface="Kalinga"/>
-        <a:font script="Mlym" typeface="Kartika"/>
-        <a:font script="Laoo" typeface="DokChampa"/>
-        <a:font script="Sinh" typeface="Iskoola Pota"/>
-        <a:font script="Mong" typeface="Mongolian Baiti"/>
-        <a:font script="Viet" typeface="Arial"/>
-        <a:font script="Uigh" typeface="Microsoft Uighur"/>
-        <a:font script="Geor" typeface="Sylfaen"/>
-      </a:minorFont>
-    </a:fontScheme>
-    <a:fmtScheme name="Office">
-      <a:fillStyleLst>
-        <a:solidFill>
-          <a:schemeClr val="phClr"/>
-        </a:solidFill>
-        <a:gradFill rotWithShape="1">
-          <a:gsLst>
-            <a:gs pos="0">
-              <a:schemeClr val="phClr">
-                <a:tint val="50000"/>
-                <a:satMod val="300000"/>
-              </a:schemeClr>
-            </a:gs>
-            <a:gs pos="35000">
-              <a:schemeClr val="phClr">
-                <a:tint val="37000"/>
-                <a:satMod val="300000"/>
-              </a:schemeClr>
-            </a:gs>
-            <a:gs pos="100000">
-              <a:schemeClr val="phClr">
-                <a:tint val="15000"/>
-                <a:satMod val="350000"/>
-              </a:schemeClr>
-            </a:gs>
-          </a:gsLst>
-          <a:lin ang="16200000" scaled="1"/>
-        </a:gradFill>
-        <a:gradFill rotWithShape="1">
-          <a:gsLst>
-            <a:gs pos="0">
-              <a:schemeClr val="phClr">
-                <a:tint val="100000"/>
-                <a:shade val="100000"/>
-                <a:satMod val="130000"/>
-              </a:schemeClr>
-            </a:gs>
-            <a:gs pos="100000">
-              <a:schemeClr val="phClr">
-                <a:tint val="50000"/>
-                <a:shade val="100000"/>
-                <a:satMod val="350000"/>
-              </a:schemeClr>
-            </a:gs>
-          </a:gsLst>
-          <a:lin ang="16200000" scaled="0"/>
-        </a:gradFill>
-      </a:fillStyleLst>
-      <a:lnStyleLst>
-        <a:ln w="9525" cap="flat" cmpd="sng" algn="ctr">
-          <a:solidFill>
-            <a:schemeClr val="phClr">
-              <a:shade val="95000"/>
-              <a:satMod val="105000"/>
-            </a:schemeClr>
-          </a:solidFill>
-          <a:prstDash val="solid"/>
-        </a:ln>
-        <a:ln w="25400" cap="flat" cmpd="sng" algn="ctr">
-          <a:solidFill>
-            <a:schemeClr val="phClr"/>
-          </a:solidFill>
-          <a:prstDash val="solid"/>
-        </a:ln>
-        <a:ln w="38100" cap="flat" cmpd="sng" algn="ctr">
-          <a:solidFill>
-            <a:schemeClr val="phClr"/>
-          </a:solidFill>
-          <a:prstDash val="solid"/>
-        </a:ln>
-      </a:lnStyleLst>
-      <a:effectStyleLst>
-        <a:effectStyle>
-          <a:effectLst>
-            <a:outerShdw blurRad="40000" dist="20000" dir="5400000" rotWithShape="0">
-              <a:srgbClr val="000000">
-                <a:alpha val="38000"/>
-              </a:srgbClr>
-            </a:outerShdw>
-          </a:effectLst>
-        </a:effectStyle>
-        <a:effectStyle>
-          <a:effectLst>
-            <a:outerShdw blurRad="40000" dist="23000" dir="5400000" rotWithShape="0">
-              <a:srgbClr val="000000">
-                <a:alpha val="35000"/>
-              </a:srgbClr>
-            </a:outerShdw>
-          </a:effectLst>
-        </a:effectStyle>
-        <a:effectStyle>
-          <a:effectLst>
-            <a:outerShdw blurRad="40000" dist="23000" dir="5400000" rotWithShape="0">
-              <a:srgbClr val="000000">
-                <a:alpha val="35000"/>
-              </a:srgbClr>
-            </a:outerShdw>
-          </a:effectLst>
-          <a:scene3d>
-            <a:camera prst="orthographicFront">
-              <a:rot lat="0" lon="0" rev="0"/>
-            </a:camera>
-            <a:lightRig rig="threePt" dir="t">
-              <a:rot lat="0" lon="0" rev="1200000"/>
-            </a:lightRig>
-          </a:scene3d>
-          <a:sp3d>
-            <a:bevelT w="63500" h="25400"/>
-          </a:sp3d>
-        </a:effectStyle>
-      </a:effectStyleLst>
-      <a:bgFillStyleLst>
-        <a:solidFill>
-          <a:schemeClr val="phClr"/>
-        </a:solidFill>
-        <a:gradFill rotWithShape="1">
-          <a:gsLst>
-            <a:gs pos="0">
-              <a:schemeClr val="phClr">
-                <a:tint val="40000"/>
-                <a:satMod val="350000"/>
-              </a:schemeClr>
-            </a:gs>
-            <a:gs pos="40000">
-              <a:schemeClr val="phClr">
-                <a:tint val="45000"/>
-                <a:shade val="99000"/>
-                <a:satMod val="350000"/>
-              </a:schemeClr>
-            </a:gs>
-            <a:gs pos="100000">
-              <a:schemeClr val="phClr">
-                <a:shade val="20000"/>
-                <a:satMod val="255000"/>
-              </a:schemeClr>
-            </a:gs>
-          </a:gsLst>
-          <a:path path="circle">
-            <a:fillToRect l="50000" t="-80000" r="50000" b="180000"/>
-          </a:path>
-        </a:gradFill>
-        <a:gradFill rotWithShape="1">
-          <a:gsLst>
-            <a:gs pos="0">
-              <a:schemeClr val="phClr">
-                <a:tint val="80000"/>
-                <a:satMod val="300000"/>
-              </a:schemeClr>
-            </a:gs>
-            <a:gs pos="100000">
-              <a:schemeClr val="phClr">
-                <a:shade val="30000"/>
-                <a:satMod val="200000"/>
-              </a:schemeClr>
-            </a:gs>
-          </a:gsLst>
-          <a:path path="circle">
-            <a:fillToRect l="50000" t="50000" r="50000" b="50000"/>
-          </a:path>
-        </a:gradFill>
-      </a:bgFillStyleLst>
-    </a:fmtScheme>
-  </a:themeElements>
-</a:theme>
 </file>
</xml_diff>